<commit_message>
update cicd, slides, iac
</commit_message>
<xml_diff>
--- a/slides/HostingForLess.pptx
+++ b/slides/HostingForLess.pptx
@@ -7,16 +7,23 @@
   <p:sldIdLst>
     <p:sldId id="256" r:id="rId2"/>
     <p:sldId id="257" r:id="rId3"/>
-    <p:sldId id="258" r:id="rId4"/>
-    <p:sldId id="259" r:id="rId5"/>
-    <p:sldId id="260" r:id="rId6"/>
-    <p:sldId id="261" r:id="rId7"/>
-    <p:sldId id="265" r:id="rId8"/>
-    <p:sldId id="262" r:id="rId9"/>
-    <p:sldId id="263" r:id="rId10"/>
-    <p:sldId id="264" r:id="rId11"/>
-    <p:sldId id="266" r:id="rId12"/>
-    <p:sldId id="267" r:id="rId13"/>
+    <p:sldId id="268" r:id="rId4"/>
+    <p:sldId id="258" r:id="rId5"/>
+    <p:sldId id="259" r:id="rId6"/>
+    <p:sldId id="260" r:id="rId7"/>
+    <p:sldId id="272" r:id="rId8"/>
+    <p:sldId id="265" r:id="rId9"/>
+    <p:sldId id="269" r:id="rId10"/>
+    <p:sldId id="262" r:id="rId11"/>
+    <p:sldId id="264" r:id="rId12"/>
+    <p:sldId id="273" r:id="rId13"/>
+    <p:sldId id="270" r:id="rId14"/>
+    <p:sldId id="261" r:id="rId15"/>
+    <p:sldId id="266" r:id="rId16"/>
+    <p:sldId id="274" r:id="rId17"/>
+    <p:sldId id="267" r:id="rId18"/>
+    <p:sldId id="271" r:id="rId19"/>
+    <p:sldId id="263" r:id="rId20"/>
   </p:sldIdLst>
   <p:sldSz cx="12192000" cy="6858000"/>
   <p:notesSz cx="6858000" cy="9144000"/>
@@ -115,6 +122,11 @@
       </a:defRPr>
     </a:lvl9pPr>
   </p:defaultTextStyle>
+  <p:extLst>
+    <p:ext uri="{EFAFB233-063F-42B5-8137-9DF3F51BA10A}">
+      <p15:sldGuideLst xmlns:p15="http://schemas.microsoft.com/office/powerpoint/2012/main"/>
+    </p:ext>
+  </p:extLst>
 </p:presentation>
 </file>
 
@@ -257,7 +269,7 @@
           <a:p>
             <a:fld id="{EEE1771A-2A40-4266-B4C2-1497629EFEBC}" type="datetimeFigureOut">
               <a:rPr lang="en-US" smtClean="0"/>
-              <a:t>11/5/2025</a:t>
+              <a:t>11/10/2025</a:t>
             </a:fld>
             <a:endParaRPr lang="en-US"/>
           </a:p>
@@ -468,7 +480,7 @@
           <a:p>
             <a:fld id="{EEE1771A-2A40-4266-B4C2-1497629EFEBC}" type="datetimeFigureOut">
               <a:rPr lang="en-US" smtClean="0"/>
-              <a:t>11/5/2025</a:t>
+              <a:t>11/10/2025</a:t>
             </a:fld>
             <a:endParaRPr lang="en-US"/>
           </a:p>
@@ -683,7 +695,7 @@
           <a:p>
             <a:fld id="{EEE1771A-2A40-4266-B4C2-1497629EFEBC}" type="datetimeFigureOut">
               <a:rPr lang="en-US" smtClean="0"/>
-              <a:t>11/5/2025</a:t>
+              <a:t>11/10/2025</a:t>
             </a:fld>
             <a:endParaRPr lang="en-US"/>
           </a:p>
@@ -884,7 +896,7 @@
           <a:p>
             <a:fld id="{EEE1771A-2A40-4266-B4C2-1497629EFEBC}" type="datetimeFigureOut">
               <a:rPr lang="en-US" smtClean="0"/>
-              <a:t>11/5/2025</a:t>
+              <a:t>11/10/2025</a:t>
             </a:fld>
             <a:endParaRPr lang="en-US"/>
           </a:p>
@@ -1163,7 +1175,7 @@
           <a:p>
             <a:fld id="{EEE1771A-2A40-4266-B4C2-1497629EFEBC}" type="datetimeFigureOut">
               <a:rPr lang="en-US" smtClean="0"/>
-              <a:t>11/5/2025</a:t>
+              <a:t>11/10/2025</a:t>
             </a:fld>
             <a:endParaRPr lang="en-US"/>
           </a:p>
@@ -1431,7 +1443,7 @@
           <a:p>
             <a:fld id="{EEE1771A-2A40-4266-B4C2-1497629EFEBC}" type="datetimeFigureOut">
               <a:rPr lang="en-US" smtClean="0"/>
-              <a:t>11/5/2025</a:t>
+              <a:t>11/10/2025</a:t>
             </a:fld>
             <a:endParaRPr lang="en-US"/>
           </a:p>
@@ -1847,7 +1859,7 @@
           <a:p>
             <a:fld id="{EEE1771A-2A40-4266-B4C2-1497629EFEBC}" type="datetimeFigureOut">
               <a:rPr lang="en-US" smtClean="0"/>
-              <a:t>11/5/2025</a:t>
+              <a:t>11/10/2025</a:t>
             </a:fld>
             <a:endParaRPr lang="en-US"/>
           </a:p>
@@ -1996,7 +2008,7 @@
           <a:p>
             <a:fld id="{EEE1771A-2A40-4266-B4C2-1497629EFEBC}" type="datetimeFigureOut">
               <a:rPr lang="en-US" smtClean="0"/>
-              <a:t>11/5/2025</a:t>
+              <a:t>11/10/2025</a:t>
             </a:fld>
             <a:endParaRPr lang="en-US"/>
           </a:p>
@@ -2122,7 +2134,7 @@
           <a:p>
             <a:fld id="{EEE1771A-2A40-4266-B4C2-1497629EFEBC}" type="datetimeFigureOut">
               <a:rPr lang="en-US" smtClean="0"/>
-              <a:t>11/5/2025</a:t>
+              <a:t>11/10/2025</a:t>
             </a:fld>
             <a:endParaRPr lang="en-US"/>
           </a:p>
@@ -2373,7 +2385,7 @@
           <a:p>
             <a:fld id="{EEE1771A-2A40-4266-B4C2-1497629EFEBC}" type="datetimeFigureOut">
               <a:rPr lang="en-US" smtClean="0"/>
-              <a:t>11/5/2025</a:t>
+              <a:t>11/10/2025</a:t>
             </a:fld>
             <a:endParaRPr lang="en-US"/>
           </a:p>
@@ -2818,7 +2830,7 @@
           <a:p>
             <a:fld id="{EEE1771A-2A40-4266-B4C2-1497629EFEBC}" type="datetimeFigureOut">
               <a:rPr lang="en-US" smtClean="0"/>
-              <a:t>11/5/2025</a:t>
+              <a:t>11/10/2025</a:t>
             </a:fld>
             <a:endParaRPr lang="en-US"/>
           </a:p>
@@ -3145,7 +3157,7 @@
           <a:p>
             <a:fld id="{EEE1771A-2A40-4266-B4C2-1497629EFEBC}" type="datetimeFigureOut">
               <a:rPr lang="en-US" smtClean="0"/>
-              <a:t>11/5/2025</a:t>
+              <a:t>11/10/2025</a:t>
             </a:fld>
             <a:endParaRPr lang="en-US"/>
           </a:p>
@@ -3719,10 +3731,10 @@
       </p:grpSpPr>
       <p:sp>
         <p:nvSpPr>
-          <p:cNvPr id="4" name="Title 3">
+          <p:cNvPr id="2" name="Title 1">
             <a:extLst>
               <a:ext uri="{FF2B5EF4-FFF2-40B4-BE49-F238E27FC236}">
-                <a16:creationId xmlns:a16="http://schemas.microsoft.com/office/drawing/2014/main" id="{EB61569A-A4F0-6657-4AB0-1BDB4E8A7568}"/>
+                <a16:creationId xmlns:a16="http://schemas.microsoft.com/office/drawing/2014/main" id="{F7D19408-5BF9-4994-E96F-0F50DEE4F8E3}"/>
               </a:ext>
             </a:extLst>
           </p:cNvPr>
@@ -3730,27 +3742,27 @@
             <a:spLocks noGrp="1"/>
           </p:cNvSpPr>
           <p:nvPr>
-            <p:ph type="ctrTitle"/>
-          </p:nvPr>
-        </p:nvSpPr>
-        <p:spPr/>
-        <p:txBody>
-          <a:bodyPr/>
-          <a:lstStyle/>
-          <a:p>
-            <a:r>
-              <a:rPr lang="en-US" dirty="0"/>
-              <a:t>Q&amp;A</a:t>
-            </a:r>
-          </a:p>
-        </p:txBody>
-      </p:sp>
-      <p:sp>
-        <p:nvSpPr>
-          <p:cNvPr id="5" name="Subtitle 4">
+            <p:ph type="title"/>
+          </p:nvPr>
+        </p:nvSpPr>
+        <p:spPr/>
+        <p:txBody>
+          <a:bodyPr/>
+          <a:lstStyle/>
+          <a:p>
+            <a:r>
+              <a:rPr lang="en-US" dirty="0"/>
+              <a:t>Demo</a:t>
+            </a:r>
+          </a:p>
+        </p:txBody>
+      </p:sp>
+      <p:sp>
+        <p:nvSpPr>
+          <p:cNvPr id="4" name="Content Placeholder 3">
             <a:extLst>
               <a:ext uri="{FF2B5EF4-FFF2-40B4-BE49-F238E27FC236}">
-                <a16:creationId xmlns:a16="http://schemas.microsoft.com/office/drawing/2014/main" id="{C69750F4-06B0-D070-4DCB-FB4D854348C7}"/>
+                <a16:creationId xmlns:a16="http://schemas.microsoft.com/office/drawing/2014/main" id="{1D6B9800-0F06-4DD3-3DCF-471B5618859D}"/>
               </a:ext>
             </a:extLst>
           </p:cNvPr>
@@ -3758,22 +3770,64 @@
             <a:spLocks noGrp="1"/>
           </p:cNvSpPr>
           <p:nvPr>
-            <p:ph type="subTitle" idx="1"/>
-          </p:nvPr>
-        </p:nvSpPr>
-        <p:spPr/>
-        <p:txBody>
-          <a:bodyPr/>
-          <a:lstStyle/>
-          <a:p>
-            <a:endParaRPr lang="en-US"/>
+            <p:ph idx="1"/>
+          </p:nvPr>
+        </p:nvSpPr>
+        <p:spPr/>
+        <p:txBody>
+          <a:bodyPr/>
+          <a:lstStyle/>
+          <a:p>
+            <a:pPr marL="457200" indent="-457200">
+              <a:buFont typeface="+mj-lt"/>
+              <a:buAutoNum type="arabicPeriod"/>
+            </a:pPr>
+            <a:r>
+              <a:rPr lang="en-US" dirty="0"/>
+              <a:t>Create Next.js app</a:t>
+            </a:r>
+          </a:p>
+          <a:p>
+            <a:pPr marL="457200" indent="-457200">
+              <a:buFont typeface="+mj-lt"/>
+              <a:buAutoNum type="arabicPeriod"/>
+            </a:pPr>
+            <a:r>
+              <a:rPr lang="en-US" dirty="0"/>
+              <a:t>Create Cloud Resources using </a:t>
+            </a:r>
+            <a:r>
+              <a:rPr lang="en-US" dirty="0" err="1"/>
+              <a:t>IaC</a:t>
+            </a:r>
+            <a:r>
+              <a:rPr lang="en-US" dirty="0"/>
+              <a:t> (infrastructure as a code) template</a:t>
+            </a:r>
+          </a:p>
+          <a:p>
+            <a:pPr marL="457200" indent="-457200">
+              <a:buFont typeface="+mj-lt"/>
+              <a:buAutoNum type="arabicPeriod"/>
+            </a:pPr>
+            <a:r>
+              <a:rPr lang="en-US" dirty="0"/>
+              <a:t>Deployment</a:t>
+            </a:r>
+          </a:p>
+          <a:p>
+            <a:pPr marL="457200" indent="-457200">
+              <a:buFont typeface="+mj-lt"/>
+              <a:buAutoNum type="arabicPeriod"/>
+            </a:pPr>
+            <a:endParaRPr lang="en-US" dirty="0"/>
           </a:p>
         </p:txBody>
       </p:sp>
     </p:spTree>
     <p:extLst>
       <p:ext uri="{BB962C8B-B14F-4D97-AF65-F5344CB8AC3E}">
-        <p14:creationId xmlns:p14="http://schemas.microsoft.com/office/powerpoint/2010/main" val="4025723527"/>
+        <p14:creationId xmlns:p14="http://schemas.microsoft.com/office/powerpoint/2010/main" val="89405554"/>
       </p:ext>
     </p:extLst>
   </p:cSld>
@@ -3802,10 +3856,10 @@
       </p:grpSpPr>
       <p:sp>
         <p:nvSpPr>
-          <p:cNvPr id="2" name="Title 1">
+          <p:cNvPr id="4" name="Title 3">
             <a:extLst>
               <a:ext uri="{FF2B5EF4-FFF2-40B4-BE49-F238E27FC236}">
-                <a16:creationId xmlns:a16="http://schemas.microsoft.com/office/drawing/2014/main" id="{C064BE45-9299-DA37-495F-158AAA8F94C2}"/>
+                <a16:creationId xmlns:a16="http://schemas.microsoft.com/office/drawing/2014/main" id="{EB61569A-A4F0-6657-4AB0-1BDB4E8A7568}"/>
               </a:ext>
             </a:extLst>
           </p:cNvPr>
@@ -3813,27 +3867,27 @@
             <a:spLocks noGrp="1"/>
           </p:cNvSpPr>
           <p:nvPr>
-            <p:ph type="title"/>
-          </p:nvPr>
-        </p:nvSpPr>
-        <p:spPr/>
-        <p:txBody>
-          <a:bodyPr/>
-          <a:lstStyle/>
-          <a:p>
-            <a:r>
-              <a:rPr lang="en-US" dirty="0"/>
-              <a:t>Benefit</a:t>
-            </a:r>
-          </a:p>
-        </p:txBody>
-      </p:sp>
-      <p:sp>
-        <p:nvSpPr>
-          <p:cNvPr id="3" name="Content Placeholder 2">
+            <p:ph type="ctrTitle"/>
+          </p:nvPr>
+        </p:nvSpPr>
+        <p:spPr/>
+        <p:txBody>
+          <a:bodyPr/>
+          <a:lstStyle/>
+          <a:p>
+            <a:r>
+              <a:rPr lang="en-US" dirty="0"/>
+              <a:t>Q&amp;A</a:t>
+            </a:r>
+          </a:p>
+        </p:txBody>
+      </p:sp>
+      <p:sp>
+        <p:nvSpPr>
+          <p:cNvPr id="3" name="Subtitle 2">
             <a:extLst>
               <a:ext uri="{FF2B5EF4-FFF2-40B4-BE49-F238E27FC236}">
-                <a16:creationId xmlns:a16="http://schemas.microsoft.com/office/drawing/2014/main" id="{95357B84-2AB6-B5E4-8924-9DD28AE38024}"/>
+                <a16:creationId xmlns:a16="http://schemas.microsoft.com/office/drawing/2014/main" id="{795EDF31-F064-8986-1563-26A1964287ED}"/>
               </a:ext>
             </a:extLst>
           </p:cNvPr>
@@ -3841,73 +3895,22 @@
             <a:spLocks noGrp="1"/>
           </p:cNvSpPr>
           <p:nvPr>
-            <p:ph idx="1"/>
-          </p:nvPr>
-        </p:nvSpPr>
-        <p:spPr/>
-        <p:txBody>
-          <a:bodyPr/>
-          <a:lstStyle/>
-          <a:p>
-            <a:r>
-              <a:rPr lang="en-US" dirty="0"/>
-              <a:t>Cloud</a:t>
-            </a:r>
-          </a:p>
-          <a:p>
-            <a:pPr lvl="1"/>
-            <a:r>
-              <a:rPr lang="en-US" dirty="0"/>
-              <a:t>Pay as you go</a:t>
-            </a:r>
-          </a:p>
-          <a:p>
-            <a:pPr lvl="1"/>
-            <a:r>
-              <a:rPr lang="en-US" dirty="0"/>
-              <a:t>Scalable</a:t>
-            </a:r>
-          </a:p>
-          <a:p>
-            <a:pPr lvl="1"/>
-            <a:r>
-              <a:rPr lang="en-US" dirty="0"/>
-              <a:t>Serverless</a:t>
-            </a:r>
-          </a:p>
-          <a:p>
-            <a:r>
-              <a:rPr lang="en-US" dirty="0"/>
-              <a:t>SPA</a:t>
-            </a:r>
-          </a:p>
-          <a:p>
-            <a:pPr lvl="1"/>
-            <a:r>
-              <a:rPr lang="en-US" dirty="0"/>
-              <a:t>Easier to maintain than static files</a:t>
-            </a:r>
-          </a:p>
-          <a:p>
-            <a:pPr lvl="1"/>
-            <a:r>
-              <a:rPr lang="en-US" dirty="0"/>
-              <a:t>Fast</a:t>
-            </a:r>
-          </a:p>
-          <a:p>
-            <a:pPr lvl="1"/>
-            <a:r>
-              <a:rPr lang="en-US" dirty="0"/>
-              <a:t>Industry standard</a:t>
-            </a:r>
+            <p:ph type="subTitle" idx="1"/>
+          </p:nvPr>
+        </p:nvSpPr>
+        <p:spPr/>
+        <p:txBody>
+          <a:bodyPr/>
+          <a:lstStyle/>
+          <a:p>
+            <a:endParaRPr lang="en-US"/>
           </a:p>
         </p:txBody>
       </p:sp>
     </p:spTree>
     <p:extLst>
       <p:ext uri="{BB962C8B-B14F-4D97-AF65-F5344CB8AC3E}">
-        <p14:creationId xmlns:p14="http://schemas.microsoft.com/office/powerpoint/2010/main" val="1140699584"/>
+        <p14:creationId xmlns:p14="http://schemas.microsoft.com/office/powerpoint/2010/main" val="4025723527"/>
       </p:ext>
     </p:extLst>
   </p:cSld>
@@ -3936,6 +3939,535 @@
       </p:grpSpPr>
       <p:sp>
         <p:nvSpPr>
+          <p:cNvPr id="8" name="Title 7">
+            <a:extLst>
+              <a:ext uri="{FF2B5EF4-FFF2-40B4-BE49-F238E27FC236}">
+                <a16:creationId xmlns:a16="http://schemas.microsoft.com/office/drawing/2014/main" id="{83F8E5C0-DE83-A0B4-F503-58C3FBC624F3}"/>
+              </a:ext>
+            </a:extLst>
+          </p:cNvPr>
+          <p:cNvSpPr>
+            <a:spLocks noGrp="1"/>
+          </p:cNvSpPr>
+          <p:nvPr>
+            <p:ph type="ctrTitle"/>
+          </p:nvPr>
+        </p:nvSpPr>
+        <p:spPr/>
+        <p:txBody>
+          <a:bodyPr/>
+          <a:lstStyle/>
+          <a:p>
+            <a:r>
+              <a:rPr lang="en-US" dirty="0"/>
+              <a:t>Thank you!</a:t>
+            </a:r>
+          </a:p>
+        </p:txBody>
+      </p:sp>
+      <p:sp>
+        <p:nvSpPr>
+          <p:cNvPr id="9" name="Subtitle 8">
+            <a:extLst>
+              <a:ext uri="{FF2B5EF4-FFF2-40B4-BE49-F238E27FC236}">
+                <a16:creationId xmlns:a16="http://schemas.microsoft.com/office/drawing/2014/main" id="{79C458A9-F913-F5AC-EC0E-BC8E87F4050D}"/>
+              </a:ext>
+            </a:extLst>
+          </p:cNvPr>
+          <p:cNvSpPr>
+            <a:spLocks noGrp="1"/>
+          </p:cNvSpPr>
+          <p:nvPr>
+            <p:ph type="subTitle" idx="1"/>
+          </p:nvPr>
+        </p:nvSpPr>
+        <p:spPr/>
+        <p:txBody>
+          <a:bodyPr/>
+          <a:lstStyle/>
+          <a:p>
+            <a:endParaRPr lang="en-US"/>
+          </a:p>
+        </p:txBody>
+      </p:sp>
+    </p:spTree>
+    <p:extLst>
+      <p:ext uri="{BB962C8B-B14F-4D97-AF65-F5344CB8AC3E}">
+        <p14:creationId xmlns:p14="http://schemas.microsoft.com/office/powerpoint/2010/main" val="300800482"/>
+      </p:ext>
+    </p:extLst>
+  </p:cSld>
+  <p:clrMapOvr>
+    <a:masterClrMapping/>
+  </p:clrMapOvr>
+</p:sld>
+</file>
+
+<file path=ppt/slides/slide13.xml><?xml version="1.0" encoding="utf-8"?>
+<p:sld xmlns:a="http://schemas.openxmlformats.org/drawingml/2006/main" xmlns:r="http://schemas.openxmlformats.org/officeDocument/2006/relationships" xmlns:p="http://schemas.openxmlformats.org/presentationml/2006/main">
+  <p:cSld>
+    <p:spTree>
+      <p:nvGrpSpPr>
+        <p:cNvPr id="1" name=""/>
+        <p:cNvGrpSpPr/>
+        <p:nvPr/>
+      </p:nvGrpSpPr>
+      <p:grpSpPr>
+        <a:xfrm>
+          <a:off x="0" y="0"/>
+          <a:ext cx="0" cy="0"/>
+          <a:chOff x="0" y="0"/>
+          <a:chExt cx="0" cy="0"/>
+        </a:xfrm>
+      </p:grpSpPr>
+      <p:sp>
+        <p:nvSpPr>
+          <p:cNvPr id="2" name="Title 1">
+            <a:extLst>
+              <a:ext uri="{FF2B5EF4-FFF2-40B4-BE49-F238E27FC236}">
+                <a16:creationId xmlns:a16="http://schemas.microsoft.com/office/drawing/2014/main" id="{E9C64109-B19D-772A-C2D5-8774C54285E2}"/>
+              </a:ext>
+            </a:extLst>
+          </p:cNvPr>
+          <p:cNvSpPr>
+            <a:spLocks noGrp="1"/>
+          </p:cNvSpPr>
+          <p:nvPr>
+            <p:ph type="title"/>
+          </p:nvPr>
+        </p:nvSpPr>
+        <p:spPr/>
+        <p:txBody>
+          <a:bodyPr/>
+          <a:lstStyle/>
+          <a:p>
+            <a:r>
+              <a:rPr lang="en-US" dirty="0"/>
+              <a:t>FAQ</a:t>
+            </a:r>
+          </a:p>
+        </p:txBody>
+      </p:sp>
+      <p:sp>
+        <p:nvSpPr>
+          <p:cNvPr id="3" name="Content Placeholder 2">
+            <a:extLst>
+              <a:ext uri="{FF2B5EF4-FFF2-40B4-BE49-F238E27FC236}">
+                <a16:creationId xmlns:a16="http://schemas.microsoft.com/office/drawing/2014/main" id="{60433331-D5C0-9D5F-82C0-CB2E0EF96596}"/>
+              </a:ext>
+            </a:extLst>
+          </p:cNvPr>
+          <p:cNvSpPr>
+            <a:spLocks noGrp="1"/>
+          </p:cNvSpPr>
+          <p:nvPr>
+            <p:ph idx="1"/>
+          </p:nvPr>
+        </p:nvSpPr>
+        <p:spPr/>
+        <p:txBody>
+          <a:bodyPr/>
+          <a:lstStyle/>
+          <a:p>
+            <a:r>
+              <a:rPr lang="en-US" dirty="0"/>
+              <a:t>What happened when I accidentally launched expensive service?</a:t>
+            </a:r>
+          </a:p>
+          <a:p>
+            <a:pPr lvl="1"/>
+            <a:r>
+              <a:rPr lang="en-US" dirty="0"/>
+              <a:t>Contact AWS support and they can provide refund</a:t>
+            </a:r>
+          </a:p>
+          <a:p>
+            <a:r>
+              <a:rPr lang="en-US" dirty="0"/>
+              <a:t>Is Cloud secured?</a:t>
+            </a:r>
+          </a:p>
+          <a:p>
+            <a:pPr lvl="1"/>
+            <a:r>
+              <a:rPr lang="en-US" dirty="0"/>
+              <a:t>Yes, but part of it is our responsibility</a:t>
+            </a:r>
+          </a:p>
+          <a:p>
+            <a:endParaRPr lang="en-US" dirty="0"/>
+          </a:p>
+        </p:txBody>
+      </p:sp>
+    </p:spTree>
+    <p:extLst>
+      <p:ext uri="{BB962C8B-B14F-4D97-AF65-F5344CB8AC3E}">
+        <p14:creationId xmlns:p14="http://schemas.microsoft.com/office/powerpoint/2010/main" val="3587067192"/>
+      </p:ext>
+    </p:extLst>
+  </p:cSld>
+  <p:clrMapOvr>
+    <a:masterClrMapping/>
+  </p:clrMapOvr>
+</p:sld>
+</file>
+
+<file path=ppt/slides/slide14.xml><?xml version="1.0" encoding="utf-8"?>
+<p:sld xmlns:a="http://schemas.openxmlformats.org/drawingml/2006/main" xmlns:r="http://schemas.openxmlformats.org/officeDocument/2006/relationships" xmlns:p="http://schemas.openxmlformats.org/presentationml/2006/main">
+  <p:cSld>
+    <p:spTree>
+      <p:nvGrpSpPr>
+        <p:cNvPr id="1" name=""/>
+        <p:cNvGrpSpPr/>
+        <p:nvPr/>
+      </p:nvGrpSpPr>
+      <p:grpSpPr>
+        <a:xfrm>
+          <a:off x="0" y="0"/>
+          <a:ext cx="0" cy="0"/>
+          <a:chOff x="0" y="0"/>
+          <a:chExt cx="0" cy="0"/>
+        </a:xfrm>
+      </p:grpSpPr>
+      <p:sp>
+        <p:nvSpPr>
+          <p:cNvPr id="2" name="Title 1">
+            <a:extLst>
+              <a:ext uri="{FF2B5EF4-FFF2-40B4-BE49-F238E27FC236}">
+                <a16:creationId xmlns:a16="http://schemas.microsoft.com/office/drawing/2014/main" id="{F65E284A-13CC-185F-9DD4-19F2718F5911}"/>
+              </a:ext>
+            </a:extLst>
+          </p:cNvPr>
+          <p:cNvSpPr>
+            <a:spLocks noGrp="1"/>
+          </p:cNvSpPr>
+          <p:nvPr>
+            <p:ph type="title"/>
+          </p:nvPr>
+        </p:nvSpPr>
+        <p:spPr/>
+        <p:txBody>
+          <a:bodyPr/>
+          <a:lstStyle/>
+          <a:p>
+            <a:r>
+              <a:rPr lang="en-US" dirty="0"/>
+              <a:t>Setup</a:t>
+            </a:r>
+          </a:p>
+        </p:txBody>
+      </p:sp>
+      <p:sp>
+        <p:nvSpPr>
+          <p:cNvPr id="3" name="Content Placeholder 2">
+            <a:extLst>
+              <a:ext uri="{FF2B5EF4-FFF2-40B4-BE49-F238E27FC236}">
+                <a16:creationId xmlns:a16="http://schemas.microsoft.com/office/drawing/2014/main" id="{14691CEB-407B-C521-3D2F-87AB94AC0D82}"/>
+              </a:ext>
+            </a:extLst>
+          </p:cNvPr>
+          <p:cNvSpPr>
+            <a:spLocks noGrp="1"/>
+          </p:cNvSpPr>
+          <p:nvPr>
+            <p:ph idx="1"/>
+          </p:nvPr>
+        </p:nvSpPr>
+        <p:spPr/>
+        <p:txBody>
+          <a:bodyPr/>
+          <a:lstStyle/>
+          <a:p>
+            <a:r>
+              <a:rPr lang="en-US" b="1" dirty="0"/>
+              <a:t>Website</a:t>
+            </a:r>
+            <a:r>
+              <a:rPr lang="en-US" dirty="0"/>
+              <a:t>: Next.js - SPA with SSG (Static Server Generation) capability</a:t>
+            </a:r>
+          </a:p>
+          <a:p>
+            <a:r>
+              <a:rPr lang="en-US" b="1" dirty="0"/>
+              <a:t>Source Control</a:t>
+            </a:r>
+            <a:r>
+              <a:rPr lang="en-US" dirty="0"/>
+              <a:t>: Git + GitHub</a:t>
+            </a:r>
+          </a:p>
+          <a:p>
+            <a:r>
+              <a:rPr lang="en-US" b="1" dirty="0"/>
+              <a:t>Deployment automation</a:t>
+            </a:r>
+            <a:r>
+              <a:rPr lang="en-US" dirty="0"/>
+              <a:t>: GitHub Actions</a:t>
+            </a:r>
+          </a:p>
+          <a:p>
+            <a:r>
+              <a:rPr lang="en-US" b="1" dirty="0"/>
+              <a:t>Hosting Infrastructure</a:t>
+            </a:r>
+            <a:r>
+              <a:rPr lang="en-US" dirty="0"/>
+              <a:t>: CloudFront + S3 (Serverless services in Cloud)</a:t>
+            </a:r>
+          </a:p>
+          <a:p>
+            <a:r>
+              <a:rPr lang="en-US" b="1" dirty="0"/>
+              <a:t>Supporting Infrastructure</a:t>
+            </a:r>
+            <a:r>
+              <a:rPr lang="en-US" dirty="0"/>
+              <a:t>:</a:t>
+            </a:r>
+          </a:p>
+          <a:p>
+            <a:pPr lvl="1"/>
+            <a:r>
+              <a:rPr lang="en-US" dirty="0"/>
+              <a:t>SSL Certificate: ACM</a:t>
+            </a:r>
+          </a:p>
+          <a:p>
+            <a:pPr lvl="1"/>
+            <a:r>
+              <a:rPr lang="en-US" dirty="0"/>
+              <a:t>DNS: Cloudflare</a:t>
+            </a:r>
+          </a:p>
+          <a:p>
+            <a:endParaRPr lang="en-US" dirty="0"/>
+          </a:p>
+        </p:txBody>
+      </p:sp>
+    </p:spTree>
+    <p:extLst>
+      <p:ext uri="{BB962C8B-B14F-4D97-AF65-F5344CB8AC3E}">
+        <p14:creationId xmlns:p14="http://schemas.microsoft.com/office/powerpoint/2010/main" val="2558966999"/>
+      </p:ext>
+    </p:extLst>
+  </p:cSld>
+  <p:clrMapOvr>
+    <a:masterClrMapping/>
+  </p:clrMapOvr>
+</p:sld>
+</file>
+
+<file path=ppt/slides/slide15.xml><?xml version="1.0" encoding="utf-8"?>
+<p:sld xmlns:a="http://schemas.openxmlformats.org/drawingml/2006/main" xmlns:r="http://schemas.openxmlformats.org/officeDocument/2006/relationships" xmlns:p="http://schemas.openxmlformats.org/presentationml/2006/main">
+  <p:cSld>
+    <p:spTree>
+      <p:nvGrpSpPr>
+        <p:cNvPr id="1" name=""/>
+        <p:cNvGrpSpPr/>
+        <p:nvPr/>
+      </p:nvGrpSpPr>
+      <p:grpSpPr>
+        <a:xfrm>
+          <a:off x="0" y="0"/>
+          <a:ext cx="0" cy="0"/>
+          <a:chOff x="0" y="0"/>
+          <a:chExt cx="0" cy="0"/>
+        </a:xfrm>
+      </p:grpSpPr>
+      <p:sp>
+        <p:nvSpPr>
+          <p:cNvPr id="2" name="Title 1">
+            <a:extLst>
+              <a:ext uri="{FF2B5EF4-FFF2-40B4-BE49-F238E27FC236}">
+                <a16:creationId xmlns:a16="http://schemas.microsoft.com/office/drawing/2014/main" id="{C064BE45-9299-DA37-495F-158AAA8F94C2}"/>
+              </a:ext>
+            </a:extLst>
+          </p:cNvPr>
+          <p:cNvSpPr>
+            <a:spLocks noGrp="1"/>
+          </p:cNvSpPr>
+          <p:nvPr>
+            <p:ph type="title"/>
+          </p:nvPr>
+        </p:nvSpPr>
+        <p:spPr/>
+        <p:txBody>
+          <a:bodyPr/>
+          <a:lstStyle/>
+          <a:p>
+            <a:r>
+              <a:rPr lang="en-US" dirty="0"/>
+              <a:t>Why SPA?</a:t>
+            </a:r>
+          </a:p>
+        </p:txBody>
+      </p:sp>
+      <p:sp>
+        <p:nvSpPr>
+          <p:cNvPr id="3" name="Content Placeholder 2">
+            <a:extLst>
+              <a:ext uri="{FF2B5EF4-FFF2-40B4-BE49-F238E27FC236}">
+                <a16:creationId xmlns:a16="http://schemas.microsoft.com/office/drawing/2014/main" id="{95357B84-2AB6-B5E4-8924-9DD28AE38024}"/>
+              </a:ext>
+            </a:extLst>
+          </p:cNvPr>
+          <p:cNvSpPr>
+            <a:spLocks noGrp="1"/>
+          </p:cNvSpPr>
+          <p:nvPr>
+            <p:ph idx="1"/>
+          </p:nvPr>
+        </p:nvSpPr>
+        <p:spPr/>
+        <p:txBody>
+          <a:bodyPr/>
+          <a:lstStyle/>
+          <a:p>
+            <a:r>
+              <a:rPr lang="en-US" dirty="0"/>
+              <a:t>Easier to maintain than static files</a:t>
+            </a:r>
+          </a:p>
+          <a:p>
+            <a:r>
+              <a:rPr lang="en-US" dirty="0"/>
+              <a:t>Fast (run in client side)</a:t>
+            </a:r>
+          </a:p>
+          <a:p>
+            <a:r>
+              <a:rPr lang="en-US" dirty="0"/>
+              <a:t>Industry standard</a:t>
+            </a:r>
+          </a:p>
+        </p:txBody>
+      </p:sp>
+    </p:spTree>
+    <p:extLst>
+      <p:ext uri="{BB962C8B-B14F-4D97-AF65-F5344CB8AC3E}">
+        <p14:creationId xmlns:p14="http://schemas.microsoft.com/office/powerpoint/2010/main" val="1140699584"/>
+      </p:ext>
+    </p:extLst>
+  </p:cSld>
+  <p:clrMapOvr>
+    <a:masterClrMapping/>
+  </p:clrMapOvr>
+</p:sld>
+</file>
+
+<file path=ppt/slides/slide16.xml><?xml version="1.0" encoding="utf-8"?>
+<p:sld xmlns:a="http://schemas.openxmlformats.org/drawingml/2006/main" xmlns:r="http://schemas.openxmlformats.org/officeDocument/2006/relationships" xmlns:p="http://schemas.openxmlformats.org/presentationml/2006/main">
+  <p:cSld>
+    <p:spTree>
+      <p:nvGrpSpPr>
+        <p:cNvPr id="1" name=""/>
+        <p:cNvGrpSpPr/>
+        <p:nvPr/>
+      </p:nvGrpSpPr>
+      <p:grpSpPr>
+        <a:xfrm>
+          <a:off x="0" y="0"/>
+          <a:ext cx="0" cy="0"/>
+          <a:chOff x="0" y="0"/>
+          <a:chExt cx="0" cy="0"/>
+        </a:xfrm>
+      </p:grpSpPr>
+      <p:sp>
+        <p:nvSpPr>
+          <p:cNvPr id="2" name="Title 1">
+            <a:extLst>
+              <a:ext uri="{FF2B5EF4-FFF2-40B4-BE49-F238E27FC236}">
+                <a16:creationId xmlns:a16="http://schemas.microsoft.com/office/drawing/2014/main" id="{08F871E5-9BC6-3C2D-0FD8-E1D16A80900C}"/>
+              </a:ext>
+            </a:extLst>
+          </p:cNvPr>
+          <p:cNvSpPr>
+            <a:spLocks noGrp="1"/>
+          </p:cNvSpPr>
+          <p:nvPr>
+            <p:ph type="title"/>
+          </p:nvPr>
+        </p:nvSpPr>
+        <p:spPr/>
+        <p:txBody>
+          <a:bodyPr/>
+          <a:lstStyle/>
+          <a:p>
+            <a:r>
+              <a:rPr lang="en-US" dirty="0"/>
+              <a:t>Why next.js?</a:t>
+            </a:r>
+          </a:p>
+        </p:txBody>
+      </p:sp>
+      <p:sp>
+        <p:nvSpPr>
+          <p:cNvPr id="3" name="Content Placeholder 2">
+            <a:extLst>
+              <a:ext uri="{FF2B5EF4-FFF2-40B4-BE49-F238E27FC236}">
+                <a16:creationId xmlns:a16="http://schemas.microsoft.com/office/drawing/2014/main" id="{7E219E05-AEB6-B09C-FBCC-B0575539CB71}"/>
+              </a:ext>
+            </a:extLst>
+          </p:cNvPr>
+          <p:cNvSpPr>
+            <a:spLocks noGrp="1"/>
+          </p:cNvSpPr>
+          <p:nvPr>
+            <p:ph idx="1"/>
+          </p:nvPr>
+        </p:nvSpPr>
+        <p:spPr/>
+        <p:txBody>
+          <a:bodyPr/>
+          <a:lstStyle/>
+          <a:p>
+            <a:r>
+              <a:rPr lang="en-US" dirty="0"/>
+              <a:t>Support SSG</a:t>
+            </a:r>
+          </a:p>
+          <a:p>
+            <a:r>
+              <a:rPr lang="en-US" dirty="0"/>
+              <a:t>Folder based navigation/routing</a:t>
+            </a:r>
+          </a:p>
+        </p:txBody>
+      </p:sp>
+    </p:spTree>
+    <p:extLst>
+      <p:ext uri="{BB962C8B-B14F-4D97-AF65-F5344CB8AC3E}">
+        <p14:creationId xmlns:p14="http://schemas.microsoft.com/office/powerpoint/2010/main" val="912618932"/>
+      </p:ext>
+    </p:extLst>
+  </p:cSld>
+  <p:clrMapOvr>
+    <a:masterClrMapping/>
+  </p:clrMapOvr>
+</p:sld>
+</file>
+
+<file path=ppt/slides/slide17.xml><?xml version="1.0" encoding="utf-8"?>
+<p:sld xmlns:a="http://schemas.openxmlformats.org/drawingml/2006/main" xmlns:r="http://schemas.openxmlformats.org/officeDocument/2006/relationships" xmlns:p="http://schemas.openxmlformats.org/presentationml/2006/main">
+  <p:cSld>
+    <p:spTree>
+      <p:nvGrpSpPr>
+        <p:cNvPr id="1" name=""/>
+        <p:cNvGrpSpPr/>
+        <p:nvPr/>
+      </p:nvGrpSpPr>
+      <p:grpSpPr>
+        <a:xfrm>
+          <a:off x="0" y="0"/>
+          <a:ext cx="0" cy="0"/>
+          <a:chOff x="0" y="0"/>
+          <a:chExt cx="0" cy="0"/>
+        </a:xfrm>
+      </p:grpSpPr>
+      <p:sp>
+        <p:nvSpPr>
           <p:cNvPr id="2" name="Title 1">
             <a:extLst>
               <a:ext uri="{FF2B5EF4-FFF2-40B4-BE49-F238E27FC236}">
@@ -4042,6 +4574,194 @@
     <p:extLst>
       <p:ext uri="{BB962C8B-B14F-4D97-AF65-F5344CB8AC3E}">
         <p14:creationId xmlns:p14="http://schemas.microsoft.com/office/powerpoint/2010/main" val="4083863225"/>
+      </p:ext>
+    </p:extLst>
+  </p:cSld>
+  <p:clrMapOvr>
+    <a:masterClrMapping/>
+  </p:clrMapOvr>
+</p:sld>
+</file>
+
+<file path=ppt/slides/slide18.xml><?xml version="1.0" encoding="utf-8"?>
+<p:sld xmlns:a="http://schemas.openxmlformats.org/drawingml/2006/main" xmlns:r="http://schemas.openxmlformats.org/officeDocument/2006/relationships" xmlns:p="http://schemas.openxmlformats.org/presentationml/2006/main">
+  <p:cSld>
+    <p:spTree>
+      <p:nvGrpSpPr>
+        <p:cNvPr id="1" name=""/>
+        <p:cNvGrpSpPr/>
+        <p:nvPr/>
+      </p:nvGrpSpPr>
+      <p:grpSpPr>
+        <a:xfrm>
+          <a:off x="0" y="0"/>
+          <a:ext cx="0" cy="0"/>
+          <a:chOff x="0" y="0"/>
+          <a:chExt cx="0" cy="0"/>
+        </a:xfrm>
+      </p:grpSpPr>
+      <p:sp>
+        <p:nvSpPr>
+          <p:cNvPr id="2" name="Title 1">
+            <a:extLst>
+              <a:ext uri="{FF2B5EF4-FFF2-40B4-BE49-F238E27FC236}">
+                <a16:creationId xmlns:a16="http://schemas.microsoft.com/office/drawing/2014/main" id="{00323298-BA3C-4096-B752-DE122EEE05E4}"/>
+              </a:ext>
+            </a:extLst>
+          </p:cNvPr>
+          <p:cNvSpPr>
+            <a:spLocks noGrp="1"/>
+          </p:cNvSpPr>
+          <p:nvPr>
+            <p:ph type="title"/>
+          </p:nvPr>
+        </p:nvSpPr>
+        <p:spPr/>
+        <p:txBody>
+          <a:bodyPr/>
+          <a:lstStyle/>
+          <a:p>
+            <a:r>
+              <a:rPr lang="en-US" dirty="0"/>
+              <a:t>What if I need database?</a:t>
+            </a:r>
+          </a:p>
+        </p:txBody>
+      </p:sp>
+      <p:sp>
+        <p:nvSpPr>
+          <p:cNvPr id="3" name="Content Placeholder 2">
+            <a:extLst>
+              <a:ext uri="{FF2B5EF4-FFF2-40B4-BE49-F238E27FC236}">
+                <a16:creationId xmlns:a16="http://schemas.microsoft.com/office/drawing/2014/main" id="{CF3D82D3-900E-9C82-3CA4-1FA54DDA0736}"/>
+              </a:ext>
+            </a:extLst>
+          </p:cNvPr>
+          <p:cNvSpPr>
+            <a:spLocks noGrp="1"/>
+          </p:cNvSpPr>
+          <p:nvPr>
+            <p:ph idx="1"/>
+          </p:nvPr>
+        </p:nvSpPr>
+        <p:spPr/>
+        <p:txBody>
+          <a:bodyPr/>
+          <a:lstStyle/>
+          <a:p>
+            <a:r>
+              <a:rPr lang="en-US" dirty="0"/>
+              <a:t>API Gateway + Lambda + DynamoDB</a:t>
+            </a:r>
+          </a:p>
+        </p:txBody>
+      </p:sp>
+    </p:spTree>
+    <p:extLst>
+      <p:ext uri="{BB962C8B-B14F-4D97-AF65-F5344CB8AC3E}">
+        <p14:creationId xmlns:p14="http://schemas.microsoft.com/office/powerpoint/2010/main" val="2078914260"/>
+      </p:ext>
+    </p:extLst>
+  </p:cSld>
+  <p:clrMapOvr>
+    <a:masterClrMapping/>
+  </p:clrMapOvr>
+</p:sld>
+</file>
+
+<file path=ppt/slides/slide19.xml><?xml version="1.0" encoding="utf-8"?>
+<p:sld xmlns:a="http://schemas.openxmlformats.org/drawingml/2006/main" xmlns:r="http://schemas.openxmlformats.org/officeDocument/2006/relationships" xmlns:p="http://schemas.openxmlformats.org/presentationml/2006/main">
+  <p:cSld>
+    <p:spTree>
+      <p:nvGrpSpPr>
+        <p:cNvPr id="1" name=""/>
+        <p:cNvGrpSpPr/>
+        <p:nvPr/>
+      </p:nvGrpSpPr>
+      <p:grpSpPr>
+        <a:xfrm>
+          <a:off x="0" y="0"/>
+          <a:ext cx="0" cy="0"/>
+          <a:chOff x="0" y="0"/>
+          <a:chExt cx="0" cy="0"/>
+        </a:xfrm>
+      </p:grpSpPr>
+      <p:sp>
+        <p:nvSpPr>
+          <p:cNvPr id="2" name="Title 1">
+            <a:extLst>
+              <a:ext uri="{FF2B5EF4-FFF2-40B4-BE49-F238E27FC236}">
+                <a16:creationId xmlns:a16="http://schemas.microsoft.com/office/drawing/2014/main" id="{7EE9BF38-F472-5716-5FFA-48CAE1153E59}"/>
+              </a:ext>
+            </a:extLst>
+          </p:cNvPr>
+          <p:cNvSpPr>
+            <a:spLocks noGrp="1"/>
+          </p:cNvSpPr>
+          <p:nvPr>
+            <p:ph type="title"/>
+          </p:nvPr>
+        </p:nvSpPr>
+        <p:spPr/>
+        <p:txBody>
+          <a:bodyPr/>
+          <a:lstStyle/>
+          <a:p>
+            <a:r>
+              <a:rPr lang="en-US" dirty="0" err="1"/>
+              <a:t>WEb</a:t>
+            </a:r>
+            <a:endParaRPr lang="en-US" dirty="0"/>
+          </a:p>
+        </p:txBody>
+      </p:sp>
+      <p:sp>
+        <p:nvSpPr>
+          <p:cNvPr id="3" name="Content Placeholder 2">
+            <a:extLst>
+              <a:ext uri="{FF2B5EF4-FFF2-40B4-BE49-F238E27FC236}">
+                <a16:creationId xmlns:a16="http://schemas.microsoft.com/office/drawing/2014/main" id="{ABA38916-5EA9-A841-22FB-89329874B2DA}"/>
+              </a:ext>
+            </a:extLst>
+          </p:cNvPr>
+          <p:cNvSpPr>
+            <a:spLocks noGrp="1"/>
+          </p:cNvSpPr>
+          <p:nvPr>
+            <p:ph idx="1"/>
+          </p:nvPr>
+        </p:nvSpPr>
+        <p:spPr/>
+        <p:txBody>
+          <a:bodyPr/>
+          <a:lstStyle/>
+          <a:p>
+            <a:r>
+              <a:rPr lang="en-US" dirty="0"/>
+              <a:t>GitHub</a:t>
+            </a:r>
+          </a:p>
+          <a:p>
+            <a:r>
+              <a:rPr lang="en-US" dirty="0"/>
+              <a:t>Cloudflare</a:t>
+            </a:r>
+          </a:p>
+          <a:p>
+            <a:r>
+              <a:rPr lang="en-US" dirty="0"/>
+              <a:t>AWS</a:t>
+            </a:r>
+          </a:p>
+          <a:p>
+            <a:endParaRPr lang="en-US" dirty="0"/>
+          </a:p>
+        </p:txBody>
+      </p:sp>
+    </p:spTree>
+    <p:extLst>
+      <p:ext uri="{BB962C8B-B14F-4D97-AF65-F5344CB8AC3E}">
+        <p14:creationId xmlns:p14="http://schemas.microsoft.com/office/powerpoint/2010/main" val="3979525413"/>
       </p:ext>
     </p:extLst>
   </p:cSld>
@@ -4114,7 +4834,9 @@
         </p:nvSpPr>
         <p:spPr/>
         <p:txBody>
-          <a:bodyPr/>
+          <a:bodyPr>
+            <a:normAutofit lnSpcReduction="10000"/>
+          </a:bodyPr>
           <a:lstStyle/>
           <a:p>
             <a:pPr marL="514350" indent="-514350">
@@ -4123,7 +4845,7 @@
             </a:pPr>
             <a:r>
               <a:rPr lang="en-US" dirty="0"/>
-              <a:t>Web Developer</a:t>
+              <a:t>Programmer (Web + Desktop app)</a:t>
             </a:r>
           </a:p>
           <a:p>
@@ -4133,7 +4855,7 @@
             </a:pPr>
             <a:r>
               <a:rPr lang="en-US" dirty="0"/>
-              <a:t>Mobile App</a:t>
+              <a:t>Web Developer</a:t>
             </a:r>
           </a:p>
           <a:p>
@@ -4143,8 +4865,54 @@
             </a:pPr>
             <a:r>
               <a:rPr lang="en-US" dirty="0"/>
+              <a:t>Software Engineer (Web + Mobile app)</a:t>
+            </a:r>
+          </a:p>
+          <a:p>
+            <a:pPr marL="514350" indent="-514350">
+              <a:buFont typeface="+mj-lt"/>
+              <a:buAutoNum type="arabicPeriod"/>
+            </a:pPr>
+            <a:r>
+              <a:rPr lang="en-US" dirty="0"/>
               <a:t>Cloud and DevOps</a:t>
             </a:r>
+          </a:p>
+          <a:p>
+            <a:pPr marL="514350" indent="-514350">
+              <a:buFont typeface="+mj-lt"/>
+              <a:buAutoNum type="arabicPeriod"/>
+            </a:pPr>
+            <a:r>
+              <a:rPr lang="en-US" dirty="0"/>
+              <a:t>Certifications:</a:t>
+            </a:r>
+          </a:p>
+          <a:p>
+            <a:pPr lvl="1"/>
+            <a:r>
+              <a:rPr lang="en-US" dirty="0"/>
+              <a:t>AWS</a:t>
+            </a:r>
+          </a:p>
+          <a:p>
+            <a:pPr lvl="1"/>
+            <a:r>
+              <a:rPr lang="en-US" dirty="0"/>
+              <a:t>Microsoft</a:t>
+            </a:r>
+          </a:p>
+          <a:p>
+            <a:pPr lvl="1"/>
+            <a:r>
+              <a:rPr lang="en-US" dirty="0"/>
+              <a:t>GCP, FinOps, OCI, </a:t>
+            </a:r>
+            <a:r>
+              <a:rPr lang="en-US" dirty="0" err="1"/>
+              <a:t>etc</a:t>
+            </a:r>
+            <a:endParaRPr lang="en-US" dirty="0"/>
           </a:p>
           <a:p>
             <a:pPr marL="514350" indent="-514350">
@@ -4190,7 +4958,7 @@
           <p:cNvPr id="2" name="Title 1">
             <a:extLst>
               <a:ext uri="{FF2B5EF4-FFF2-40B4-BE49-F238E27FC236}">
-                <a16:creationId xmlns:a16="http://schemas.microsoft.com/office/drawing/2014/main" id="{156DA06F-A5F4-0876-443D-E344A042C6AA}"/>
+                <a16:creationId xmlns:a16="http://schemas.microsoft.com/office/drawing/2014/main" id="{8AB6555B-B692-E767-98C9-2119EC3170C9}"/>
               </a:ext>
             </a:extLst>
           </p:cNvPr>
@@ -4208,7 +4976,7 @@
           <a:p>
             <a:r>
               <a:rPr lang="en-US" dirty="0"/>
-              <a:t>Old</a:t>
+              <a:t>What is Cloud?</a:t>
             </a:r>
           </a:p>
         </p:txBody>
@@ -4218,7 +4986,7 @@
           <p:cNvPr id="3" name="Content Placeholder 2">
             <a:extLst>
               <a:ext uri="{FF2B5EF4-FFF2-40B4-BE49-F238E27FC236}">
-                <a16:creationId xmlns:a16="http://schemas.microsoft.com/office/drawing/2014/main" id="{F444092B-0E7A-45EA-367E-9229BA84A55C}"/>
+                <a16:creationId xmlns:a16="http://schemas.microsoft.com/office/drawing/2014/main" id="{643941EA-66DB-1870-55A2-41C91C0BC877}"/>
               </a:ext>
             </a:extLst>
           </p:cNvPr>
@@ -4236,21 +5004,60 @@
           <a:p>
             <a:r>
               <a:rPr lang="en-US" dirty="0"/>
-              <a:t>$12/month hosting</a:t>
-            </a:r>
-          </a:p>
-          <a:p>
-            <a:r>
-              <a:rPr lang="en-US" dirty="0"/>
-              <a:t>Web forms (20+ years old tech)</a:t>
-            </a:r>
+              <a:t>Storage and more</a:t>
+            </a:r>
+          </a:p>
+          <a:p>
+            <a:r>
+              <a:rPr lang="en-US" dirty="0"/>
+              <a:t>Datacenter as a service</a:t>
+            </a:r>
+          </a:p>
+          <a:p>
+            <a:r>
+              <a:rPr lang="en-US" dirty="0"/>
+              <a:t>Services:</a:t>
+            </a:r>
+          </a:p>
+          <a:p>
+            <a:pPr lvl="1"/>
+            <a:r>
+              <a:rPr lang="en-US" dirty="0"/>
+              <a:t>Load balancer</a:t>
+            </a:r>
+          </a:p>
+          <a:p>
+            <a:pPr lvl="1"/>
+            <a:r>
+              <a:rPr lang="en-US" dirty="0"/>
+              <a:t>Virtual machine</a:t>
+            </a:r>
+          </a:p>
+          <a:p>
+            <a:pPr lvl="1"/>
+            <a:r>
+              <a:rPr lang="en-US" dirty="0"/>
+              <a:t>Kubernetes cluster</a:t>
+            </a:r>
+          </a:p>
+          <a:p>
+            <a:pPr lvl="1"/>
+            <a:r>
+              <a:rPr lang="en-US" dirty="0"/>
+              <a:t>Database, Messaging broker,  AI, </a:t>
+            </a:r>
+            <a:r>
+              <a:rPr lang="en-US" dirty="0" err="1"/>
+              <a:t>etc</a:t>
+            </a:r>
+            <a:endParaRPr lang="en-US" dirty="0"/>
           </a:p>
         </p:txBody>
       </p:sp>
     </p:spTree>
     <p:extLst>
       <p:ext uri="{BB962C8B-B14F-4D97-AF65-F5344CB8AC3E}">
-        <p14:creationId xmlns:p14="http://schemas.microsoft.com/office/powerpoint/2010/main" val="2522447558"/>
+        <p14:creationId xmlns:p14="http://schemas.microsoft.com/office/powerpoint/2010/main" val="4294562613"/>
       </p:ext>
     </p:extLst>
   </p:cSld>
@@ -4282,7 +5089,7 @@
           <p:cNvPr id="2" name="Title 1">
             <a:extLst>
               <a:ext uri="{FF2B5EF4-FFF2-40B4-BE49-F238E27FC236}">
-                <a16:creationId xmlns:a16="http://schemas.microsoft.com/office/drawing/2014/main" id="{B2E368BE-DB51-4B71-28FE-F651F2F08000}"/>
+                <a16:creationId xmlns:a16="http://schemas.microsoft.com/office/drawing/2014/main" id="{156DA06F-A5F4-0876-443D-E344A042C6AA}"/>
               </a:ext>
             </a:extLst>
           </p:cNvPr>
@@ -4300,7 +5107,7 @@
           <a:p>
             <a:r>
               <a:rPr lang="en-US" dirty="0"/>
-              <a:t>Requirements</a:t>
+              <a:t>NOT SO LONG TIME AGO</a:t>
             </a:r>
           </a:p>
         </p:txBody>
@@ -4310,7 +5117,7 @@
           <p:cNvPr id="3" name="Content Placeholder 2">
             <a:extLst>
               <a:ext uri="{FF2B5EF4-FFF2-40B4-BE49-F238E27FC236}">
-                <a16:creationId xmlns:a16="http://schemas.microsoft.com/office/drawing/2014/main" id="{4F658B13-1937-CE3B-BF39-4E6EBBD8F30B}"/>
+                <a16:creationId xmlns:a16="http://schemas.microsoft.com/office/drawing/2014/main" id="{F444092B-0E7A-45EA-367E-9229BA84A55C}"/>
               </a:ext>
             </a:extLst>
           </p:cNvPr>
@@ -4328,19 +5135,13 @@
           <a:p>
             <a:r>
               <a:rPr lang="en-US" dirty="0"/>
-              <a:t>Low-cost hosting</a:t>
-            </a:r>
-          </a:p>
-          <a:p>
-            <a:r>
-              <a:rPr lang="en-US" dirty="0"/>
-              <a:t>Modern</a:t>
-            </a:r>
-          </a:p>
-          <a:p>
-            <a:r>
-              <a:rPr lang="en-US" dirty="0"/>
-              <a:t>Easy to maintain</a:t>
+              <a:t>$12/month traditional hosting</a:t>
+            </a:r>
+          </a:p>
+          <a:p>
+            <a:r>
+              <a:rPr lang="en-US" dirty="0"/>
+              <a:t>ASP.NET Web Forms (20+ years old tech)</a:t>
             </a:r>
           </a:p>
         </p:txBody>
@@ -4348,7 +5149,7 @@
     </p:spTree>
     <p:extLst>
       <p:ext uri="{BB962C8B-B14F-4D97-AF65-F5344CB8AC3E}">
-        <p14:creationId xmlns:p14="http://schemas.microsoft.com/office/powerpoint/2010/main" val="632525823"/>
+        <p14:creationId xmlns:p14="http://schemas.microsoft.com/office/powerpoint/2010/main" val="2522447558"/>
       </p:ext>
     </p:extLst>
   </p:cSld>
@@ -4380,6 +5181,104 @@
           <p:cNvPr id="2" name="Title 1">
             <a:extLst>
               <a:ext uri="{FF2B5EF4-FFF2-40B4-BE49-F238E27FC236}">
+                <a16:creationId xmlns:a16="http://schemas.microsoft.com/office/drawing/2014/main" id="{B2E368BE-DB51-4B71-28FE-F651F2F08000}"/>
+              </a:ext>
+            </a:extLst>
+          </p:cNvPr>
+          <p:cNvSpPr>
+            <a:spLocks noGrp="1"/>
+          </p:cNvSpPr>
+          <p:nvPr>
+            <p:ph type="title"/>
+          </p:nvPr>
+        </p:nvSpPr>
+        <p:spPr/>
+        <p:txBody>
+          <a:bodyPr/>
+          <a:lstStyle/>
+          <a:p>
+            <a:r>
+              <a:rPr lang="en-US" dirty="0"/>
+              <a:t>Requirements</a:t>
+            </a:r>
+          </a:p>
+        </p:txBody>
+      </p:sp>
+      <p:sp>
+        <p:nvSpPr>
+          <p:cNvPr id="3" name="Content Placeholder 2">
+            <a:extLst>
+              <a:ext uri="{FF2B5EF4-FFF2-40B4-BE49-F238E27FC236}">
+                <a16:creationId xmlns:a16="http://schemas.microsoft.com/office/drawing/2014/main" id="{4F658B13-1937-CE3B-BF39-4E6EBBD8F30B}"/>
+              </a:ext>
+            </a:extLst>
+          </p:cNvPr>
+          <p:cNvSpPr>
+            <a:spLocks noGrp="1"/>
+          </p:cNvSpPr>
+          <p:nvPr>
+            <p:ph idx="1"/>
+          </p:nvPr>
+        </p:nvSpPr>
+        <p:spPr/>
+        <p:txBody>
+          <a:bodyPr/>
+          <a:lstStyle/>
+          <a:p>
+            <a:r>
+              <a:rPr lang="en-US" dirty="0"/>
+              <a:t>Low-cost hosting</a:t>
+            </a:r>
+          </a:p>
+          <a:p>
+            <a:r>
+              <a:rPr lang="en-US" dirty="0"/>
+              <a:t>Modern</a:t>
+            </a:r>
+          </a:p>
+          <a:p>
+            <a:r>
+              <a:rPr lang="en-US" dirty="0"/>
+              <a:t>Easy to maintain</a:t>
+            </a:r>
+          </a:p>
+        </p:txBody>
+      </p:sp>
+    </p:spTree>
+    <p:extLst>
+      <p:ext uri="{BB962C8B-B14F-4D97-AF65-F5344CB8AC3E}">
+        <p14:creationId xmlns:p14="http://schemas.microsoft.com/office/powerpoint/2010/main" val="632525823"/>
+      </p:ext>
+    </p:extLst>
+  </p:cSld>
+  <p:clrMapOvr>
+    <a:masterClrMapping/>
+  </p:clrMapOvr>
+</p:sld>
+</file>
+
+<file path=ppt/slides/slide6.xml><?xml version="1.0" encoding="utf-8"?>
+<p:sld xmlns:a="http://schemas.openxmlformats.org/drawingml/2006/main" xmlns:r="http://schemas.openxmlformats.org/officeDocument/2006/relationships" xmlns:p="http://schemas.openxmlformats.org/presentationml/2006/main">
+  <p:cSld>
+    <p:spTree>
+      <p:nvGrpSpPr>
+        <p:cNvPr id="1" name=""/>
+        <p:cNvGrpSpPr/>
+        <p:nvPr/>
+      </p:nvGrpSpPr>
+      <p:grpSpPr>
+        <a:xfrm>
+          <a:off x="0" y="0"/>
+          <a:ext cx="0" cy="0"/>
+          <a:chOff x="0" y="0"/>
+          <a:chExt cx="0" cy="0"/>
+        </a:xfrm>
+      </p:grpSpPr>
+      <p:sp>
+        <p:nvSpPr>
+          <p:cNvPr id="2" name="Title 1">
+            <a:extLst>
+              <a:ext uri="{FF2B5EF4-FFF2-40B4-BE49-F238E27FC236}">
                 <a16:creationId xmlns:a16="http://schemas.microsoft.com/office/drawing/2014/main" id="{0285563A-7F48-6380-D50B-EB2E5AF8499E}"/>
               </a:ext>
             </a:extLst>
@@ -4398,7 +5297,7 @@
           <a:p>
             <a:r>
               <a:rPr lang="en-US" dirty="0"/>
-              <a:t>New</a:t>
+              <a:t>TODAY</a:t>
             </a:r>
           </a:p>
         </p:txBody>
@@ -4426,23 +5325,85 @@
           <a:p>
             <a:r>
               <a:rPr lang="en-US" dirty="0"/>
+              <a:t>Hosting Cost: less than $1/month</a:t>
+            </a:r>
+          </a:p>
+          <a:p>
+            <a:r>
+              <a:rPr lang="en-US" dirty="0"/>
               <a:t>Cloud + SPA (Single Page Application)</a:t>
             </a:r>
           </a:p>
           <a:p>
+            <a:pPr lvl="1"/>
             <a:r>
               <a:rPr lang="en-US" dirty="0"/>
               <a:t>AWS + Next.JS (based on React JS)</a:t>
             </a:r>
           </a:p>
           <a:p>
-            <a:r>
-              <a:rPr lang="en-US" dirty="0"/>
-              <a:t>Cost: less than $1/month</a:t>
-            </a:r>
-          </a:p>
-          <a:p>
             <a:endParaRPr lang="en-US" dirty="0"/>
+          </a:p>
+          <a:p>
+            <a:endParaRPr lang="en-US" dirty="0"/>
+          </a:p>
+        </p:txBody>
+      </p:sp>
+    </p:spTree>
+    <p:extLst>
+      <p:ext uri="{BB962C8B-B14F-4D97-AF65-F5344CB8AC3E}">
+        <p14:creationId xmlns:p14="http://schemas.microsoft.com/office/powerpoint/2010/main" val="3049252189"/>
+      </p:ext>
+    </p:extLst>
+  </p:cSld>
+  <p:clrMapOvr>
+    <a:masterClrMapping/>
+  </p:clrMapOvr>
+</p:sld>
+</file>
+
+<file path=ppt/slides/slide7.xml><?xml version="1.0" encoding="utf-8"?>
+<p:sld xmlns:a="http://schemas.openxmlformats.org/drawingml/2006/main" xmlns:r="http://schemas.openxmlformats.org/officeDocument/2006/relationships" xmlns:p="http://schemas.openxmlformats.org/presentationml/2006/main">
+  <p:cSld>
+    <p:spTree>
+      <p:nvGrpSpPr>
+        <p:cNvPr id="1" name=""/>
+        <p:cNvGrpSpPr/>
+        <p:nvPr/>
+      </p:nvGrpSpPr>
+      <p:grpSpPr>
+        <a:xfrm>
+          <a:off x="0" y="0"/>
+          <a:ext cx="0" cy="0"/>
+          <a:chOff x="0" y="0"/>
+          <a:chExt cx="0" cy="0"/>
+        </a:xfrm>
+      </p:grpSpPr>
+      <p:sp>
+        <p:nvSpPr>
+          <p:cNvPr id="2" name="Title 1">
+            <a:extLst>
+              <a:ext uri="{FF2B5EF4-FFF2-40B4-BE49-F238E27FC236}">
+                <a16:creationId xmlns:a16="http://schemas.microsoft.com/office/drawing/2014/main" id="{C34F9D96-F8B2-1291-0328-101CC22E253D}"/>
+              </a:ext>
+            </a:extLst>
+          </p:cNvPr>
+          <p:cNvSpPr>
+            <a:spLocks noGrp="1"/>
+          </p:cNvSpPr>
+          <p:nvPr>
+            <p:ph type="title"/>
+          </p:nvPr>
+        </p:nvSpPr>
+        <p:spPr/>
+        <p:txBody>
+          <a:bodyPr/>
+          <a:lstStyle/>
+          <a:p>
+            <a:r>
+              <a:rPr lang="en-US" dirty="0"/>
+              <a:t>MONTHLY PRICING</a:t>
+            </a:r>
           </a:p>
         </p:txBody>
       </p:sp>
@@ -4461,14 +5422,14 @@
           <p:nvPr>
             <p:extLst>
               <p:ext uri="{D42A27DB-BD31-4B8C-83A1-F6EECF244321}">
-                <p14:modId xmlns:p14="http://schemas.microsoft.com/office/powerpoint/2010/main" val="1371667062"/>
+                <p14:modId xmlns:p14="http://schemas.microsoft.com/office/powerpoint/2010/main" val="1931133887"/>
               </p:ext>
             </p:extLst>
           </p:nvPr>
         </p:nvGraphicFramePr>
         <p:xfrm>
-          <a:off x="838200" y="3445034"/>
-          <a:ext cx="10343931" cy="2494280"/>
+          <a:off x="1451579" y="2015732"/>
+          <a:ext cx="9257585" cy="2667000"/>
         </p:xfrm>
         <a:graphic>
           <a:graphicData uri="http://schemas.openxmlformats.org/drawingml/2006/table">
@@ -4477,21 +5438,21 @@
                 <a:tableStyleId>{5C22544A-7EE6-4342-B048-85BDC9FD1C3A}</a:tableStyleId>
               </a:tblPr>
               <a:tblGrid>
-                <a:gridCol w="1920766">
+                <a:gridCol w="2064069">
                   <a:extLst>
                     <a:ext uri="{9D8B030D-6E8A-4147-A177-3AD203B41FA5}">
                       <a16:colId xmlns:a16="http://schemas.microsoft.com/office/drawing/2014/main" val="427775255"/>
                     </a:ext>
                   </a:extLst>
                 </a:gridCol>
-                <a:gridCol w="1426779">
+                <a:gridCol w="1783666">
                   <a:extLst>
                     <a:ext uri="{9D8B030D-6E8A-4147-A177-3AD203B41FA5}">
                       <a16:colId xmlns:a16="http://schemas.microsoft.com/office/drawing/2014/main" val="413084540"/>
                     </a:ext>
                   </a:extLst>
                 </a:gridCol>
-                <a:gridCol w="6996386">
+                <a:gridCol w="5409850">
                   <a:extLst>
                     <a:ext uri="{9D8B030D-6E8A-4147-A177-3AD203B41FA5}">
                       <a16:colId xmlns:a16="http://schemas.microsoft.com/office/drawing/2014/main" val="2273504923"/>
@@ -4579,8 +5540,37 @@
                     <a:p>
                       <a:r>
                         <a:rPr lang="en-US" dirty="0"/>
-                        <a:t>$0.023/GB</a:t>
+                        <a:t>$0.023/GB storage</a:t>
                       </a:r>
+                    </a:p>
+                    <a:p>
+                      <a:r>
+                        <a:rPr lang="en-US" sz="1800" b="0" i="0" kern="1200" dirty="0">
+                          <a:solidFill>
+                            <a:schemeClr val="dk1"/>
+                          </a:solidFill>
+                          <a:effectLst/>
+                          <a:latin typeface="+mn-lt"/>
+                          <a:ea typeface="+mn-ea"/>
+                          <a:cs typeface="+mn-cs"/>
+                        </a:rPr>
+                        <a:t>$0.09/GB data out</a:t>
+                      </a:r>
+                    </a:p>
+                    <a:p>
+                      <a:r>
+                        <a:rPr lang="en-US" sz="1800" b="0" i="0" kern="1200" dirty="0">
+                          <a:solidFill>
+                            <a:schemeClr val="dk1"/>
+                          </a:solidFill>
+                          <a:effectLst/>
+                          <a:latin typeface="+mn-lt"/>
+                          <a:ea typeface="+mn-ea"/>
+                          <a:cs typeface="+mn-cs"/>
+                        </a:rPr>
+                        <a:t>$0.0004 per 1000 GET requests</a:t>
+                      </a:r>
+                      <a:endParaRPr lang="en-US" dirty="0"/>
                     </a:p>
                   </a:txBody>
                   <a:tcPr/>
@@ -4599,7 +5589,7 @@
                     <a:p>
                       <a:r>
                         <a:rPr lang="en-US" dirty="0"/>
-                        <a:t>Gate</a:t>
+                        <a:t>CDN (Gate)</a:t>
                       </a:r>
                     </a:p>
                   </a:txBody>
@@ -4711,62 +5701,7 @@
                     <a:p>
                       <a:r>
                         <a:rPr lang="en-US" dirty="0"/>
-                        <a:t>DNS (optional)</a:t>
-                      </a:r>
-                    </a:p>
-                  </a:txBody>
-                  <a:tcPr/>
-                </a:tc>
-                <a:tc>
-                  <a:txBody>
-                    <a:bodyPr/>
-                    <a:lstStyle/>
-                    <a:p>
-                      <a:r>
-                        <a:rPr lang="en-US" dirty="0"/>
-                        <a:t>Route 53</a:t>
-                      </a:r>
-                    </a:p>
-                  </a:txBody>
-                  <a:tcPr/>
-                </a:tc>
-                <a:tc>
-                  <a:txBody>
-                    <a:bodyPr/>
-                    <a:lstStyle/>
-                    <a:p>
-                      <a:r>
-                        <a:rPr lang="en-US" sz="1800" b="0" i="0" kern="1200" dirty="0">
-                          <a:solidFill>
-                            <a:schemeClr val="dk1"/>
-                          </a:solidFill>
-                          <a:effectLst/>
-                          <a:latin typeface="+mn-lt"/>
-                          <a:ea typeface="+mn-ea"/>
-                          <a:cs typeface="+mn-cs"/>
-                        </a:rPr>
-                        <a:t>$0.50 a month per hosted zone</a:t>
-                      </a:r>
-                      <a:endParaRPr lang="en-US" dirty="0"/>
-                    </a:p>
-                  </a:txBody>
-                  <a:tcPr/>
-                </a:tc>
-                <a:extLst>
-                  <a:ext uri="{0D108BD9-81ED-4DB2-BD59-A6C34878D82A}">
-                    <a16:rowId xmlns:a16="http://schemas.microsoft.com/office/drawing/2014/main" val="3654164035"/>
-                  </a:ext>
-                </a:extLst>
-              </a:tr>
-              <a:tr h="370840">
-                <a:tc>
-                  <a:txBody>
-                    <a:bodyPr/>
-                    <a:lstStyle/>
-                    <a:p>
-                      <a:r>
-                        <a:rPr lang="en-US" dirty="0"/>
-                        <a:t>DNS (alternative)</a:t>
+                        <a:t>DNS</a:t>
                       </a:r>
                     </a:p>
                   </a:txBody>
@@ -4811,7 +5746,7 @@
     </p:spTree>
     <p:extLst>
       <p:ext uri="{BB962C8B-B14F-4D97-AF65-F5344CB8AC3E}">
-        <p14:creationId xmlns:p14="http://schemas.microsoft.com/office/powerpoint/2010/main" val="3049252189"/>
+        <p14:creationId xmlns:p14="http://schemas.microsoft.com/office/powerpoint/2010/main" val="1036361155"/>
       </p:ext>
     </p:extLst>
   </p:cSld>
@@ -4821,7 +5756,7 @@
 </p:sld>
 </file>
 
-<file path=ppt/slides/slide6.xml><?xml version="1.0" encoding="utf-8"?>
+<file path=ppt/slides/slide8.xml><?xml version="1.0" encoding="utf-8"?>
 <p:sld xmlns:a="http://schemas.openxmlformats.org/drawingml/2006/main" xmlns:r="http://schemas.openxmlformats.org/officeDocument/2006/relationships" xmlns:p="http://schemas.openxmlformats.org/presentationml/2006/main">
   <p:cSld>
     <p:spTree>
@@ -4843,121 +5778,6 @@
           <p:cNvPr id="2" name="Title 1">
             <a:extLst>
               <a:ext uri="{FF2B5EF4-FFF2-40B4-BE49-F238E27FC236}">
-                <a16:creationId xmlns:a16="http://schemas.microsoft.com/office/drawing/2014/main" id="{F65E284A-13CC-185F-9DD4-19F2718F5911}"/>
-              </a:ext>
-            </a:extLst>
-          </p:cNvPr>
-          <p:cNvSpPr>
-            <a:spLocks noGrp="1"/>
-          </p:cNvSpPr>
-          <p:nvPr>
-            <p:ph type="title"/>
-          </p:nvPr>
-        </p:nvSpPr>
-        <p:spPr/>
-        <p:txBody>
-          <a:bodyPr/>
-          <a:lstStyle/>
-          <a:p>
-            <a:r>
-              <a:rPr lang="en-US" dirty="0"/>
-              <a:t>Setup</a:t>
-            </a:r>
-          </a:p>
-        </p:txBody>
-      </p:sp>
-      <p:sp>
-        <p:nvSpPr>
-          <p:cNvPr id="3" name="Content Placeholder 2">
-            <a:extLst>
-              <a:ext uri="{FF2B5EF4-FFF2-40B4-BE49-F238E27FC236}">
-                <a16:creationId xmlns:a16="http://schemas.microsoft.com/office/drawing/2014/main" id="{14691CEB-407B-C521-3D2F-87AB94AC0D82}"/>
-              </a:ext>
-            </a:extLst>
-          </p:cNvPr>
-          <p:cNvSpPr>
-            <a:spLocks noGrp="1"/>
-          </p:cNvSpPr>
-          <p:nvPr>
-            <p:ph idx="1"/>
-          </p:nvPr>
-        </p:nvSpPr>
-        <p:spPr/>
-        <p:txBody>
-          <a:bodyPr/>
-          <a:lstStyle/>
-          <a:p>
-            <a:r>
-              <a:rPr lang="en-US" dirty="0"/>
-              <a:t>Website: SPA with SSG (Static Server Generation) capability</a:t>
-            </a:r>
-          </a:p>
-          <a:p>
-            <a:r>
-              <a:rPr lang="en-US" dirty="0"/>
-              <a:t>Source Control: Git + GitHub</a:t>
-            </a:r>
-          </a:p>
-          <a:p>
-            <a:r>
-              <a:rPr lang="en-US" dirty="0"/>
-              <a:t>Deployment: GitHub Actions</a:t>
-            </a:r>
-          </a:p>
-          <a:p>
-            <a:r>
-              <a:rPr lang="en-US" dirty="0"/>
-              <a:t>Hosting Infrastructure: Cloud using </a:t>
-            </a:r>
-            <a:r>
-              <a:rPr lang="en-US" dirty="0" err="1"/>
-              <a:t>IaC</a:t>
-            </a:r>
-            <a:r>
-              <a:rPr lang="en-US" dirty="0"/>
-              <a:t> (Infrastructure as Code)</a:t>
-            </a:r>
-          </a:p>
-          <a:p>
-            <a:endParaRPr lang="en-US" dirty="0"/>
-          </a:p>
-        </p:txBody>
-      </p:sp>
-    </p:spTree>
-    <p:extLst>
-      <p:ext uri="{BB962C8B-B14F-4D97-AF65-F5344CB8AC3E}">
-        <p14:creationId xmlns:p14="http://schemas.microsoft.com/office/powerpoint/2010/main" val="2558966999"/>
-      </p:ext>
-    </p:extLst>
-  </p:cSld>
-  <p:clrMapOvr>
-    <a:masterClrMapping/>
-  </p:clrMapOvr>
-</p:sld>
-</file>
-
-<file path=ppt/slides/slide7.xml><?xml version="1.0" encoding="utf-8"?>
-<p:sld xmlns:a="http://schemas.openxmlformats.org/drawingml/2006/main" xmlns:r="http://schemas.openxmlformats.org/officeDocument/2006/relationships" xmlns:p="http://schemas.openxmlformats.org/presentationml/2006/main">
-  <p:cSld>
-    <p:spTree>
-      <p:nvGrpSpPr>
-        <p:cNvPr id="1" name=""/>
-        <p:cNvGrpSpPr/>
-        <p:nvPr/>
-      </p:nvGrpSpPr>
-      <p:grpSpPr>
-        <a:xfrm>
-          <a:off x="0" y="0"/>
-          <a:ext cx="0" cy="0"/>
-          <a:chOff x="0" y="0"/>
-          <a:chExt cx="0" cy="0"/>
-        </a:xfrm>
-      </p:grpSpPr>
-      <p:sp>
-        <p:nvSpPr>
-          <p:cNvPr id="2" name="Title 1">
-            <a:extLst>
-              <a:ext uri="{FF2B5EF4-FFF2-40B4-BE49-F238E27FC236}">
                 <a16:creationId xmlns:a16="http://schemas.microsoft.com/office/drawing/2014/main" id="{2C6CB881-5AD1-0915-E72F-27A49364C496}"/>
               </a:ext>
             </a:extLst>
@@ -4976,33 +5796,8 @@
           <a:p>
             <a:r>
               <a:rPr lang="en-US" dirty="0"/>
-              <a:t>Diagram</a:t>
-            </a:r>
-          </a:p>
-        </p:txBody>
-      </p:sp>
-      <p:sp>
-        <p:nvSpPr>
-          <p:cNvPr id="3" name="Content Placeholder 2">
-            <a:extLst>
-              <a:ext uri="{FF2B5EF4-FFF2-40B4-BE49-F238E27FC236}">
-                <a16:creationId xmlns:a16="http://schemas.microsoft.com/office/drawing/2014/main" id="{59B6C25A-BEC9-DD19-07C4-3FCCA6E6630F}"/>
-              </a:ext>
-            </a:extLst>
-          </p:cNvPr>
-          <p:cNvSpPr>
-            <a:spLocks noGrp="1"/>
-          </p:cNvSpPr>
-          <p:nvPr>
-            <p:ph idx="1"/>
-          </p:nvPr>
-        </p:nvSpPr>
-        <p:spPr/>
-        <p:txBody>
-          <a:bodyPr/>
-          <a:lstStyle/>
-          <a:p>
-            <a:endParaRPr lang="en-US" dirty="0"/>
+              <a:t>Infrastructure</a:t>
+            </a:r>
           </a:p>
         </p:txBody>
       </p:sp>
@@ -5192,6 +5987,13 @@
               <a:rPr lang="en-US" dirty="0"/>
               <a:t>S3</a:t>
             </a:r>
+            <a:br>
+              <a:rPr lang="en-US" dirty="0"/>
+            </a:br>
+            <a:r>
+              <a:rPr lang="en-US" dirty="0"/>
+              <a:t>(storage)</a:t>
+            </a:r>
           </a:p>
         </p:txBody>
       </p:sp>
@@ -5282,6 +6084,13 @@
             <a:r>
               <a:rPr lang="en-US" dirty="0"/>
               <a:t>CloudFront</a:t>
+            </a:r>
+            <a:br>
+              <a:rPr lang="en-US" dirty="0"/>
+            </a:br>
+            <a:r>
+              <a:rPr lang="en-US" dirty="0"/>
+              <a:t>(CDN)</a:t>
             </a:r>
           </a:p>
         </p:txBody>
@@ -5420,103 +6229,93 @@
           </a:fontRef>
         </p:style>
       </p:cxnSp>
+      <p:sp>
+        <p:nvSpPr>
+          <p:cNvPr id="6" name="Rectangle 5">
+            <a:extLst>
+              <a:ext uri="{FF2B5EF4-FFF2-40B4-BE49-F238E27FC236}">
+                <a16:creationId xmlns:a16="http://schemas.microsoft.com/office/drawing/2014/main" id="{ECB2E0C9-C838-4542-23AC-B117E1F90A33}"/>
+              </a:ext>
+            </a:extLst>
+          </p:cNvPr>
+          <p:cNvSpPr/>
+          <p:nvPr/>
+        </p:nvSpPr>
+        <p:spPr>
+          <a:xfrm>
+            <a:off x="3421117" y="1970691"/>
+            <a:ext cx="5565226" cy="2030604"/>
+          </a:xfrm>
+          <a:prstGeom prst="rect">
+            <a:avLst/>
+          </a:prstGeom>
+          <a:noFill/>
+          <a:ln>
+            <a:prstDash val="dash"/>
+          </a:ln>
+        </p:spPr>
+        <p:style>
+          <a:lnRef idx="2">
+            <a:schemeClr val="accent6"/>
+          </a:lnRef>
+          <a:fillRef idx="1">
+            <a:schemeClr val="lt1"/>
+          </a:fillRef>
+          <a:effectRef idx="0">
+            <a:schemeClr val="accent6"/>
+          </a:effectRef>
+          <a:fontRef idx="minor">
+            <a:schemeClr val="dk1"/>
+          </a:fontRef>
+        </p:style>
+        <p:txBody>
+          <a:bodyPr rtlCol="0" anchor="ctr"/>
+          <a:lstStyle/>
+          <a:p>
+            <a:pPr algn="ctr"/>
+            <a:endParaRPr lang="en-US"/>
+          </a:p>
+        </p:txBody>
+      </p:sp>
+      <p:sp>
+        <p:nvSpPr>
+          <p:cNvPr id="8" name="TextBox 7">
+            <a:extLst>
+              <a:ext uri="{FF2B5EF4-FFF2-40B4-BE49-F238E27FC236}">
+                <a16:creationId xmlns:a16="http://schemas.microsoft.com/office/drawing/2014/main" id="{38C03446-96F1-8DDE-8345-6C6AC57ACE3E}"/>
+              </a:ext>
+            </a:extLst>
+          </p:cNvPr>
+          <p:cNvSpPr txBox="1"/>
+          <p:nvPr/>
+        </p:nvSpPr>
+        <p:spPr>
+          <a:xfrm>
+            <a:off x="5856889" y="3537745"/>
+            <a:ext cx="693682" cy="369332"/>
+          </a:xfrm>
+          <a:prstGeom prst="rect">
+            <a:avLst/>
+          </a:prstGeom>
+          <a:noFill/>
+        </p:spPr>
+        <p:txBody>
+          <a:bodyPr wrap="square" rtlCol="0">
+            <a:spAutoFit/>
+          </a:bodyPr>
+          <a:lstStyle/>
+          <a:p>
+            <a:r>
+              <a:rPr lang="en-US" dirty="0"/>
+              <a:t>AWS</a:t>
+            </a:r>
+          </a:p>
+        </p:txBody>
+      </p:sp>
     </p:spTree>
     <p:extLst>
       <p:ext uri="{BB962C8B-B14F-4D97-AF65-F5344CB8AC3E}">
         <p14:creationId xmlns:p14="http://schemas.microsoft.com/office/powerpoint/2010/main" val="1652306107"/>
-      </p:ext>
-    </p:extLst>
-  </p:cSld>
-  <p:clrMapOvr>
-    <a:masterClrMapping/>
-  </p:clrMapOvr>
-</p:sld>
-</file>
-
-<file path=ppt/slides/slide8.xml><?xml version="1.0" encoding="utf-8"?>
-<p:sld xmlns:a="http://schemas.openxmlformats.org/drawingml/2006/main" xmlns:r="http://schemas.openxmlformats.org/officeDocument/2006/relationships" xmlns:p="http://schemas.openxmlformats.org/presentationml/2006/main">
-  <p:cSld>
-    <p:spTree>
-      <p:nvGrpSpPr>
-        <p:cNvPr id="1" name=""/>
-        <p:cNvGrpSpPr/>
-        <p:nvPr/>
-      </p:nvGrpSpPr>
-      <p:grpSpPr>
-        <a:xfrm>
-          <a:off x="0" y="0"/>
-          <a:ext cx="0" cy="0"/>
-          <a:chOff x="0" y="0"/>
-          <a:chExt cx="0" cy="0"/>
-        </a:xfrm>
-      </p:grpSpPr>
-      <p:sp>
-        <p:nvSpPr>
-          <p:cNvPr id="2" name="Title 1">
-            <a:extLst>
-              <a:ext uri="{FF2B5EF4-FFF2-40B4-BE49-F238E27FC236}">
-                <a16:creationId xmlns:a16="http://schemas.microsoft.com/office/drawing/2014/main" id="{F7D19408-5BF9-4994-E96F-0F50DEE4F8E3}"/>
-              </a:ext>
-            </a:extLst>
-          </p:cNvPr>
-          <p:cNvSpPr>
-            <a:spLocks noGrp="1"/>
-          </p:cNvSpPr>
-          <p:nvPr>
-            <p:ph type="title"/>
-          </p:nvPr>
-        </p:nvSpPr>
-        <p:spPr/>
-        <p:txBody>
-          <a:bodyPr/>
-          <a:lstStyle/>
-          <a:p>
-            <a:r>
-              <a:rPr lang="en-US" dirty="0"/>
-              <a:t>Demo</a:t>
-            </a:r>
-          </a:p>
-        </p:txBody>
-      </p:sp>
-      <p:pic>
-        <p:nvPicPr>
-          <p:cNvPr id="5" name="Content Placeholder 4">
-            <a:extLst>
-              <a:ext uri="{FF2B5EF4-FFF2-40B4-BE49-F238E27FC236}">
-                <a16:creationId xmlns:a16="http://schemas.microsoft.com/office/drawing/2014/main" id="{4AE4B53C-96ED-5BB0-7103-E95FA420448A}"/>
-              </a:ext>
-            </a:extLst>
-          </p:cNvPr>
-          <p:cNvPicPr>
-            <a:picLocks noGrp="1" noChangeAspect="1"/>
-          </p:cNvPicPr>
-          <p:nvPr>
-            <p:ph idx="1"/>
-          </p:nvPr>
-        </p:nvPicPr>
-        <p:blipFill>
-          <a:blip r:embed="rId2">
-            <a:extLst>
-              <a:ext uri="{28A0092B-C50C-407E-A947-70E740481C1C}">
-                <a14:useLocalDpi xmlns:a14="http://schemas.microsoft.com/office/drawing/2010/main" val="0"/>
-              </a:ext>
-            </a:extLst>
-          </a:blip>
-          <a:stretch>
-            <a:fillRect/>
-          </a:stretch>
-        </p:blipFill>
-        <p:spPr>
-          <a:xfrm>
-            <a:off x="1451579" y="1853754"/>
-            <a:ext cx="4056157" cy="4056157"/>
-          </a:xfrm>
-        </p:spPr>
-      </p:pic>
-    </p:spTree>
-    <p:extLst>
-      <p:ext uri="{BB962C8B-B14F-4D97-AF65-F5344CB8AC3E}">
-        <p14:creationId xmlns:p14="http://schemas.microsoft.com/office/powerpoint/2010/main" val="89405554"/>
       </p:ext>
     </p:extLst>
   </p:cSld>
@@ -5548,7 +6347,7 @@
           <p:cNvPr id="2" name="Title 1">
             <a:extLst>
               <a:ext uri="{FF2B5EF4-FFF2-40B4-BE49-F238E27FC236}">
-                <a16:creationId xmlns:a16="http://schemas.microsoft.com/office/drawing/2014/main" id="{7EE9BF38-F472-5716-5FFA-48CAE1153E59}"/>
+                <a16:creationId xmlns:a16="http://schemas.microsoft.com/office/drawing/2014/main" id="{D593AD8A-9083-F6A5-9E58-694415AA5DD4}"/>
               </a:ext>
             </a:extLst>
           </p:cNvPr>
@@ -5566,7 +6365,7 @@
           <a:p>
             <a:r>
               <a:rPr lang="en-US" dirty="0"/>
-              <a:t>History</a:t>
+              <a:t>Why Serverless?</a:t>
             </a:r>
           </a:p>
         </p:txBody>
@@ -5576,7 +6375,7 @@
           <p:cNvPr id="3" name="Content Placeholder 2">
             <a:extLst>
               <a:ext uri="{FF2B5EF4-FFF2-40B4-BE49-F238E27FC236}">
-                <a16:creationId xmlns:a16="http://schemas.microsoft.com/office/drawing/2014/main" id="{ABA38916-5EA9-A841-22FB-89329874B2DA}"/>
+                <a16:creationId xmlns:a16="http://schemas.microsoft.com/office/drawing/2014/main" id="{9FA810E9-C32C-01F9-1BD9-A690A30633F8}"/>
               </a:ext>
             </a:extLst>
           </p:cNvPr>
@@ -5592,14 +6391,29 @@
           <a:bodyPr/>
           <a:lstStyle/>
           <a:p>
-            <a:endParaRPr lang="en-US"/>
+            <a:r>
+              <a:rPr lang="en-US" dirty="0"/>
+              <a:t>No server to manage</a:t>
+            </a:r>
+          </a:p>
+          <a:p>
+            <a:r>
+              <a:rPr lang="en-US" dirty="0"/>
+              <a:t>Consumption-based pricing</a:t>
+            </a:r>
+          </a:p>
+          <a:p>
+            <a:r>
+              <a:rPr lang="en-US" dirty="0"/>
+              <a:t>Scalable</a:t>
+            </a:r>
           </a:p>
         </p:txBody>
       </p:sp>
     </p:spTree>
     <p:extLst>
       <p:ext uri="{BB962C8B-B14F-4D97-AF65-F5344CB8AC3E}">
-        <p14:creationId xmlns:p14="http://schemas.microsoft.com/office/powerpoint/2010/main" val="3979525413"/>
+        <p14:creationId xmlns:p14="http://schemas.microsoft.com/office/powerpoint/2010/main" val="3464732594"/>
       </p:ext>
     </p:extLst>
   </p:cSld>

</xml_diff>